<commit_message>
more pics and changes
</commit_message>
<xml_diff>
--- a/gitpages.pptx
+++ b/gitpages.pptx
@@ -13,6 +13,23 @@
     <p:sldId id="261" r:id="rId7"/>
     <p:sldId id="262" r:id="rId8"/>
     <p:sldId id="263" r:id="rId9"/>
+    <p:sldId id="264" r:id="rId10"/>
+    <p:sldId id="265" r:id="rId11"/>
+    <p:sldId id="266" r:id="rId12"/>
+    <p:sldId id="267" r:id="rId13"/>
+    <p:sldId id="268" r:id="rId14"/>
+    <p:sldId id="269" r:id="rId15"/>
+    <p:sldId id="270" r:id="rId16"/>
+    <p:sldId id="271" r:id="rId17"/>
+    <p:sldId id="272" r:id="rId18"/>
+    <p:sldId id="273" r:id="rId19"/>
+    <p:sldId id="274" r:id="rId20"/>
+    <p:sldId id="275" r:id="rId21"/>
+    <p:sldId id="276" r:id="rId22"/>
+    <p:sldId id="277" r:id="rId23"/>
+    <p:sldId id="278" r:id="rId24"/>
+    <p:sldId id="279" r:id="rId25"/>
+    <p:sldId id="280" r:id="rId26"/>
   </p:sldIdLst>
   <p:sldSz cx="12192000" cy="6858000"/>
   <p:notesSz cx="6858000" cy="9144000"/>
@@ -111,6 +128,11 @@
       </a:defRPr>
     </a:lvl9pPr>
   </p:defaultTextStyle>
+  <p:extLst>
+    <p:ext uri="{EFAFB233-063F-42B5-8137-9DF3F51BA10A}">
+      <p15:sldGuideLst xmlns:p15="http://schemas.microsoft.com/office/powerpoint/2012/main"/>
+    </p:ext>
+  </p:extLst>
 </p:presentation>
 </file>
 
@@ -3371,6 +3393,656 @@
 </p:sld>
 </file>
 
+<file path=ppt/slides/slide10.xml><?xml version="1.0" encoding="utf-8"?>
+<p:sld xmlns:a="http://schemas.openxmlformats.org/drawingml/2006/main" xmlns:r="http://schemas.openxmlformats.org/officeDocument/2006/relationships" xmlns:p="http://schemas.openxmlformats.org/presentationml/2006/main">
+  <p:cSld>
+    <p:spTree>
+      <p:nvGrpSpPr>
+        <p:cNvPr id="1" name=""/>
+        <p:cNvGrpSpPr/>
+        <p:nvPr/>
+      </p:nvGrpSpPr>
+      <p:grpSpPr>
+        <a:xfrm>
+          <a:off x="0" y="0"/>
+          <a:ext cx="0" cy="0"/>
+          <a:chOff x="0" y="0"/>
+          <a:chExt cx="0" cy="0"/>
+        </a:xfrm>
+      </p:grpSpPr>
+      <p:pic>
+        <p:nvPicPr>
+          <p:cNvPr id="5" name="Picture 4">
+            <a:extLst>
+              <a:ext uri="{FF2B5EF4-FFF2-40B4-BE49-F238E27FC236}">
+                <a16:creationId xmlns:a16="http://schemas.microsoft.com/office/drawing/2014/main" id="{E7221BCB-1B9A-41DE-8AB7-D23BC07CC043}"/>
+              </a:ext>
+            </a:extLst>
+          </p:cNvPr>
+          <p:cNvPicPr>
+            <a:picLocks noChangeAspect="1"/>
+          </p:cNvPicPr>
+          <p:nvPr/>
+        </p:nvPicPr>
+        <p:blipFill>
+          <a:blip r:embed="rId2"/>
+          <a:stretch>
+            <a:fillRect/>
+          </a:stretch>
+        </p:blipFill>
+        <p:spPr>
+          <a:xfrm>
+            <a:off x="0" y="0"/>
+            <a:ext cx="12192000" cy="6857999"/>
+          </a:xfrm>
+          <a:prstGeom prst="rect">
+            <a:avLst/>
+          </a:prstGeom>
+        </p:spPr>
+      </p:pic>
+    </p:spTree>
+    <p:extLst>
+      <p:ext uri="{BB962C8B-B14F-4D97-AF65-F5344CB8AC3E}">
+        <p14:creationId xmlns:p14="http://schemas.microsoft.com/office/powerpoint/2010/main" val="3999982218"/>
+      </p:ext>
+    </p:extLst>
+  </p:cSld>
+  <p:clrMapOvr>
+    <a:masterClrMapping/>
+  </p:clrMapOvr>
+</p:sld>
+</file>
+
+<file path=ppt/slides/slide11.xml><?xml version="1.0" encoding="utf-8"?>
+<p:sld xmlns:a="http://schemas.openxmlformats.org/drawingml/2006/main" xmlns:r="http://schemas.openxmlformats.org/officeDocument/2006/relationships" xmlns:p="http://schemas.openxmlformats.org/presentationml/2006/main">
+  <p:cSld>
+    <p:spTree>
+      <p:nvGrpSpPr>
+        <p:cNvPr id="1" name=""/>
+        <p:cNvGrpSpPr/>
+        <p:nvPr/>
+      </p:nvGrpSpPr>
+      <p:grpSpPr>
+        <a:xfrm>
+          <a:off x="0" y="0"/>
+          <a:ext cx="0" cy="0"/>
+          <a:chOff x="0" y="0"/>
+          <a:chExt cx="0" cy="0"/>
+        </a:xfrm>
+      </p:grpSpPr>
+      <p:pic>
+        <p:nvPicPr>
+          <p:cNvPr id="5" name="Picture 4">
+            <a:extLst>
+              <a:ext uri="{FF2B5EF4-FFF2-40B4-BE49-F238E27FC236}">
+                <a16:creationId xmlns:a16="http://schemas.microsoft.com/office/drawing/2014/main" id="{1B8900C8-9B30-4FED-B89A-225316D98A9D}"/>
+              </a:ext>
+            </a:extLst>
+          </p:cNvPr>
+          <p:cNvPicPr>
+            <a:picLocks noChangeAspect="1"/>
+          </p:cNvPicPr>
+          <p:nvPr/>
+        </p:nvPicPr>
+        <p:blipFill>
+          <a:blip r:embed="rId2"/>
+          <a:stretch>
+            <a:fillRect/>
+          </a:stretch>
+        </p:blipFill>
+        <p:spPr>
+          <a:xfrm>
+            <a:off x="0" y="0"/>
+            <a:ext cx="12192000" cy="6857999"/>
+          </a:xfrm>
+          <a:prstGeom prst="rect">
+            <a:avLst/>
+          </a:prstGeom>
+        </p:spPr>
+      </p:pic>
+    </p:spTree>
+    <p:extLst>
+      <p:ext uri="{BB962C8B-B14F-4D97-AF65-F5344CB8AC3E}">
+        <p14:creationId xmlns:p14="http://schemas.microsoft.com/office/powerpoint/2010/main" val="354571524"/>
+      </p:ext>
+    </p:extLst>
+  </p:cSld>
+  <p:clrMapOvr>
+    <a:masterClrMapping/>
+  </p:clrMapOvr>
+</p:sld>
+</file>
+
+<file path=ppt/slides/slide12.xml><?xml version="1.0" encoding="utf-8"?>
+<p:sld xmlns:a="http://schemas.openxmlformats.org/drawingml/2006/main" xmlns:r="http://schemas.openxmlformats.org/officeDocument/2006/relationships" xmlns:p="http://schemas.openxmlformats.org/presentationml/2006/main">
+  <p:cSld>
+    <p:spTree>
+      <p:nvGrpSpPr>
+        <p:cNvPr id="1" name=""/>
+        <p:cNvGrpSpPr/>
+        <p:nvPr/>
+      </p:nvGrpSpPr>
+      <p:grpSpPr>
+        <a:xfrm>
+          <a:off x="0" y="0"/>
+          <a:ext cx="0" cy="0"/>
+          <a:chOff x="0" y="0"/>
+          <a:chExt cx="0" cy="0"/>
+        </a:xfrm>
+      </p:grpSpPr>
+      <p:pic>
+        <p:nvPicPr>
+          <p:cNvPr id="5" name="Picture 4">
+            <a:extLst>
+              <a:ext uri="{FF2B5EF4-FFF2-40B4-BE49-F238E27FC236}">
+                <a16:creationId xmlns:a16="http://schemas.microsoft.com/office/drawing/2014/main" id="{69597108-A2EE-4651-993C-4EBB3ED7522F}"/>
+              </a:ext>
+            </a:extLst>
+          </p:cNvPr>
+          <p:cNvPicPr>
+            <a:picLocks noChangeAspect="1"/>
+          </p:cNvPicPr>
+          <p:nvPr/>
+        </p:nvPicPr>
+        <p:blipFill>
+          <a:blip r:embed="rId2"/>
+          <a:stretch>
+            <a:fillRect/>
+          </a:stretch>
+        </p:blipFill>
+        <p:spPr>
+          <a:xfrm>
+            <a:off x="0" y="0"/>
+            <a:ext cx="12192000" cy="6857999"/>
+          </a:xfrm>
+          <a:prstGeom prst="rect">
+            <a:avLst/>
+          </a:prstGeom>
+        </p:spPr>
+      </p:pic>
+    </p:spTree>
+    <p:extLst>
+      <p:ext uri="{BB962C8B-B14F-4D97-AF65-F5344CB8AC3E}">
+        <p14:creationId xmlns:p14="http://schemas.microsoft.com/office/powerpoint/2010/main" val="3960867517"/>
+      </p:ext>
+    </p:extLst>
+  </p:cSld>
+  <p:clrMapOvr>
+    <a:masterClrMapping/>
+  </p:clrMapOvr>
+</p:sld>
+</file>
+
+<file path=ppt/slides/slide13.xml><?xml version="1.0" encoding="utf-8"?>
+<p:sld xmlns:a="http://schemas.openxmlformats.org/drawingml/2006/main" xmlns:r="http://schemas.openxmlformats.org/officeDocument/2006/relationships" xmlns:p="http://schemas.openxmlformats.org/presentationml/2006/main">
+  <p:cSld>
+    <p:spTree>
+      <p:nvGrpSpPr>
+        <p:cNvPr id="1" name=""/>
+        <p:cNvGrpSpPr/>
+        <p:nvPr/>
+      </p:nvGrpSpPr>
+      <p:grpSpPr>
+        <a:xfrm>
+          <a:off x="0" y="0"/>
+          <a:ext cx="0" cy="0"/>
+          <a:chOff x="0" y="0"/>
+          <a:chExt cx="0" cy="0"/>
+        </a:xfrm>
+      </p:grpSpPr>
+      <p:pic>
+        <p:nvPicPr>
+          <p:cNvPr id="5" name="Picture 4">
+            <a:extLst>
+              <a:ext uri="{FF2B5EF4-FFF2-40B4-BE49-F238E27FC236}">
+                <a16:creationId xmlns:a16="http://schemas.microsoft.com/office/drawing/2014/main" id="{7816FC00-9E0A-4C0F-B419-5C3480B6C71A}"/>
+              </a:ext>
+            </a:extLst>
+          </p:cNvPr>
+          <p:cNvPicPr>
+            <a:picLocks noChangeAspect="1"/>
+          </p:cNvPicPr>
+          <p:nvPr/>
+        </p:nvPicPr>
+        <p:blipFill>
+          <a:blip r:embed="rId2"/>
+          <a:stretch>
+            <a:fillRect/>
+          </a:stretch>
+        </p:blipFill>
+        <p:spPr>
+          <a:xfrm>
+            <a:off x="0" y="0"/>
+            <a:ext cx="12192000" cy="6857999"/>
+          </a:xfrm>
+          <a:prstGeom prst="rect">
+            <a:avLst/>
+          </a:prstGeom>
+        </p:spPr>
+      </p:pic>
+    </p:spTree>
+    <p:extLst>
+      <p:ext uri="{BB962C8B-B14F-4D97-AF65-F5344CB8AC3E}">
+        <p14:creationId xmlns:p14="http://schemas.microsoft.com/office/powerpoint/2010/main" val="1389555813"/>
+      </p:ext>
+    </p:extLst>
+  </p:cSld>
+  <p:clrMapOvr>
+    <a:masterClrMapping/>
+  </p:clrMapOvr>
+</p:sld>
+</file>
+
+<file path=ppt/slides/slide14.xml><?xml version="1.0" encoding="utf-8"?>
+<p:sld xmlns:a="http://schemas.openxmlformats.org/drawingml/2006/main" xmlns:r="http://schemas.openxmlformats.org/officeDocument/2006/relationships" xmlns:p="http://schemas.openxmlformats.org/presentationml/2006/main">
+  <p:cSld>
+    <p:spTree>
+      <p:nvGrpSpPr>
+        <p:cNvPr id="1" name=""/>
+        <p:cNvGrpSpPr/>
+        <p:nvPr/>
+      </p:nvGrpSpPr>
+      <p:grpSpPr>
+        <a:xfrm>
+          <a:off x="0" y="0"/>
+          <a:ext cx="0" cy="0"/>
+          <a:chOff x="0" y="0"/>
+          <a:chExt cx="0" cy="0"/>
+        </a:xfrm>
+      </p:grpSpPr>
+      <p:pic>
+        <p:nvPicPr>
+          <p:cNvPr id="5" name="Picture 4">
+            <a:extLst>
+              <a:ext uri="{FF2B5EF4-FFF2-40B4-BE49-F238E27FC236}">
+                <a16:creationId xmlns:a16="http://schemas.microsoft.com/office/drawing/2014/main" id="{7B484D78-6026-4E4B-B304-E860D42105AA}"/>
+              </a:ext>
+            </a:extLst>
+          </p:cNvPr>
+          <p:cNvPicPr>
+            <a:picLocks noChangeAspect="1"/>
+          </p:cNvPicPr>
+          <p:nvPr/>
+        </p:nvPicPr>
+        <p:blipFill>
+          <a:blip r:embed="rId2"/>
+          <a:stretch>
+            <a:fillRect/>
+          </a:stretch>
+        </p:blipFill>
+        <p:spPr>
+          <a:xfrm>
+            <a:off x="0" y="0"/>
+            <a:ext cx="12192000" cy="6857999"/>
+          </a:xfrm>
+          <a:prstGeom prst="rect">
+            <a:avLst/>
+          </a:prstGeom>
+        </p:spPr>
+      </p:pic>
+    </p:spTree>
+    <p:extLst>
+      <p:ext uri="{BB962C8B-B14F-4D97-AF65-F5344CB8AC3E}">
+        <p14:creationId xmlns:p14="http://schemas.microsoft.com/office/powerpoint/2010/main" val="1964851278"/>
+      </p:ext>
+    </p:extLst>
+  </p:cSld>
+  <p:clrMapOvr>
+    <a:masterClrMapping/>
+  </p:clrMapOvr>
+</p:sld>
+</file>
+
+<file path=ppt/slides/slide15.xml><?xml version="1.0" encoding="utf-8"?>
+<p:sld xmlns:a="http://schemas.openxmlformats.org/drawingml/2006/main" xmlns:r="http://schemas.openxmlformats.org/officeDocument/2006/relationships" xmlns:p="http://schemas.openxmlformats.org/presentationml/2006/main">
+  <p:cSld>
+    <p:spTree>
+      <p:nvGrpSpPr>
+        <p:cNvPr id="1" name=""/>
+        <p:cNvGrpSpPr/>
+        <p:nvPr/>
+      </p:nvGrpSpPr>
+      <p:grpSpPr>
+        <a:xfrm>
+          <a:off x="0" y="0"/>
+          <a:ext cx="0" cy="0"/>
+          <a:chOff x="0" y="0"/>
+          <a:chExt cx="0" cy="0"/>
+        </a:xfrm>
+      </p:grpSpPr>
+      <p:pic>
+        <p:nvPicPr>
+          <p:cNvPr id="5" name="Picture 4">
+            <a:extLst>
+              <a:ext uri="{FF2B5EF4-FFF2-40B4-BE49-F238E27FC236}">
+                <a16:creationId xmlns:a16="http://schemas.microsoft.com/office/drawing/2014/main" id="{164B24F7-4C42-4416-AE36-7C8D7380E6B1}"/>
+              </a:ext>
+            </a:extLst>
+          </p:cNvPr>
+          <p:cNvPicPr>
+            <a:picLocks noChangeAspect="1"/>
+          </p:cNvPicPr>
+          <p:nvPr/>
+        </p:nvPicPr>
+        <p:blipFill>
+          <a:blip r:embed="rId2"/>
+          <a:stretch>
+            <a:fillRect/>
+          </a:stretch>
+        </p:blipFill>
+        <p:spPr>
+          <a:xfrm>
+            <a:off x="0" y="0"/>
+            <a:ext cx="12192000" cy="6857999"/>
+          </a:xfrm>
+          <a:prstGeom prst="rect">
+            <a:avLst/>
+          </a:prstGeom>
+        </p:spPr>
+      </p:pic>
+    </p:spTree>
+    <p:extLst>
+      <p:ext uri="{BB962C8B-B14F-4D97-AF65-F5344CB8AC3E}">
+        <p14:creationId xmlns:p14="http://schemas.microsoft.com/office/powerpoint/2010/main" val="1217350877"/>
+      </p:ext>
+    </p:extLst>
+  </p:cSld>
+  <p:clrMapOvr>
+    <a:masterClrMapping/>
+  </p:clrMapOvr>
+</p:sld>
+</file>
+
+<file path=ppt/slides/slide16.xml><?xml version="1.0" encoding="utf-8"?>
+<p:sld xmlns:a="http://schemas.openxmlformats.org/drawingml/2006/main" xmlns:r="http://schemas.openxmlformats.org/officeDocument/2006/relationships" xmlns:p="http://schemas.openxmlformats.org/presentationml/2006/main">
+  <p:cSld>
+    <p:spTree>
+      <p:nvGrpSpPr>
+        <p:cNvPr id="1" name=""/>
+        <p:cNvGrpSpPr/>
+        <p:nvPr/>
+      </p:nvGrpSpPr>
+      <p:grpSpPr>
+        <a:xfrm>
+          <a:off x="0" y="0"/>
+          <a:ext cx="0" cy="0"/>
+          <a:chOff x="0" y="0"/>
+          <a:chExt cx="0" cy="0"/>
+        </a:xfrm>
+      </p:grpSpPr>
+      <p:pic>
+        <p:nvPicPr>
+          <p:cNvPr id="5" name="Picture 4">
+            <a:extLst>
+              <a:ext uri="{FF2B5EF4-FFF2-40B4-BE49-F238E27FC236}">
+                <a16:creationId xmlns:a16="http://schemas.microsoft.com/office/drawing/2014/main" id="{8EE14249-3110-4E18-8B19-23FDB2E6C697}"/>
+              </a:ext>
+            </a:extLst>
+          </p:cNvPr>
+          <p:cNvPicPr>
+            <a:picLocks noChangeAspect="1"/>
+          </p:cNvPicPr>
+          <p:nvPr/>
+        </p:nvPicPr>
+        <p:blipFill>
+          <a:blip r:embed="rId2"/>
+          <a:stretch>
+            <a:fillRect/>
+          </a:stretch>
+        </p:blipFill>
+        <p:spPr>
+          <a:xfrm>
+            <a:off x="0" y="0"/>
+            <a:ext cx="12192000" cy="6857999"/>
+          </a:xfrm>
+          <a:prstGeom prst="rect">
+            <a:avLst/>
+          </a:prstGeom>
+        </p:spPr>
+      </p:pic>
+    </p:spTree>
+    <p:extLst>
+      <p:ext uri="{BB962C8B-B14F-4D97-AF65-F5344CB8AC3E}">
+        <p14:creationId xmlns:p14="http://schemas.microsoft.com/office/powerpoint/2010/main" val="216591664"/>
+      </p:ext>
+    </p:extLst>
+  </p:cSld>
+  <p:clrMapOvr>
+    <a:masterClrMapping/>
+  </p:clrMapOvr>
+</p:sld>
+</file>
+
+<file path=ppt/slides/slide17.xml><?xml version="1.0" encoding="utf-8"?>
+<p:sld xmlns:a="http://schemas.openxmlformats.org/drawingml/2006/main" xmlns:r="http://schemas.openxmlformats.org/officeDocument/2006/relationships" xmlns:p="http://schemas.openxmlformats.org/presentationml/2006/main">
+  <p:cSld>
+    <p:spTree>
+      <p:nvGrpSpPr>
+        <p:cNvPr id="1" name=""/>
+        <p:cNvGrpSpPr/>
+        <p:nvPr/>
+      </p:nvGrpSpPr>
+      <p:grpSpPr>
+        <a:xfrm>
+          <a:off x="0" y="0"/>
+          <a:ext cx="0" cy="0"/>
+          <a:chOff x="0" y="0"/>
+          <a:chExt cx="0" cy="0"/>
+        </a:xfrm>
+      </p:grpSpPr>
+      <p:pic>
+        <p:nvPicPr>
+          <p:cNvPr id="5" name="Picture 4">
+            <a:extLst>
+              <a:ext uri="{FF2B5EF4-FFF2-40B4-BE49-F238E27FC236}">
+                <a16:creationId xmlns:a16="http://schemas.microsoft.com/office/drawing/2014/main" id="{535B04EA-D5D5-4574-819E-6358FAC13558}"/>
+              </a:ext>
+            </a:extLst>
+          </p:cNvPr>
+          <p:cNvPicPr>
+            <a:picLocks noChangeAspect="1"/>
+          </p:cNvPicPr>
+          <p:nvPr/>
+        </p:nvPicPr>
+        <p:blipFill>
+          <a:blip r:embed="rId2"/>
+          <a:stretch>
+            <a:fillRect/>
+          </a:stretch>
+        </p:blipFill>
+        <p:spPr>
+          <a:xfrm>
+            <a:off x="0" y="0"/>
+            <a:ext cx="12192000" cy="6857999"/>
+          </a:xfrm>
+          <a:prstGeom prst="rect">
+            <a:avLst/>
+          </a:prstGeom>
+        </p:spPr>
+      </p:pic>
+    </p:spTree>
+    <p:extLst>
+      <p:ext uri="{BB962C8B-B14F-4D97-AF65-F5344CB8AC3E}">
+        <p14:creationId xmlns:p14="http://schemas.microsoft.com/office/powerpoint/2010/main" val="1099104889"/>
+      </p:ext>
+    </p:extLst>
+  </p:cSld>
+  <p:clrMapOvr>
+    <a:masterClrMapping/>
+  </p:clrMapOvr>
+</p:sld>
+</file>
+
+<file path=ppt/slides/slide18.xml><?xml version="1.0" encoding="utf-8"?>
+<p:sld xmlns:a="http://schemas.openxmlformats.org/drawingml/2006/main" xmlns:r="http://schemas.openxmlformats.org/officeDocument/2006/relationships" xmlns:p="http://schemas.openxmlformats.org/presentationml/2006/main">
+  <p:cSld>
+    <p:spTree>
+      <p:nvGrpSpPr>
+        <p:cNvPr id="1" name=""/>
+        <p:cNvGrpSpPr/>
+        <p:nvPr/>
+      </p:nvGrpSpPr>
+      <p:grpSpPr>
+        <a:xfrm>
+          <a:off x="0" y="0"/>
+          <a:ext cx="0" cy="0"/>
+          <a:chOff x="0" y="0"/>
+          <a:chExt cx="0" cy="0"/>
+        </a:xfrm>
+      </p:grpSpPr>
+      <p:pic>
+        <p:nvPicPr>
+          <p:cNvPr id="5" name="Picture 4">
+            <a:extLst>
+              <a:ext uri="{FF2B5EF4-FFF2-40B4-BE49-F238E27FC236}">
+                <a16:creationId xmlns:a16="http://schemas.microsoft.com/office/drawing/2014/main" id="{4FA6B415-F805-4B47-950B-F9E643E0B3B0}"/>
+              </a:ext>
+            </a:extLst>
+          </p:cNvPr>
+          <p:cNvPicPr>
+            <a:picLocks noChangeAspect="1"/>
+          </p:cNvPicPr>
+          <p:nvPr/>
+        </p:nvPicPr>
+        <p:blipFill>
+          <a:blip r:embed="rId2"/>
+          <a:stretch>
+            <a:fillRect/>
+          </a:stretch>
+        </p:blipFill>
+        <p:spPr>
+          <a:xfrm>
+            <a:off x="0" y="0"/>
+            <a:ext cx="12192000" cy="6857999"/>
+          </a:xfrm>
+          <a:prstGeom prst="rect">
+            <a:avLst/>
+          </a:prstGeom>
+        </p:spPr>
+      </p:pic>
+    </p:spTree>
+    <p:extLst>
+      <p:ext uri="{BB962C8B-B14F-4D97-AF65-F5344CB8AC3E}">
+        <p14:creationId xmlns:p14="http://schemas.microsoft.com/office/powerpoint/2010/main" val="3645478554"/>
+      </p:ext>
+    </p:extLst>
+  </p:cSld>
+  <p:clrMapOvr>
+    <a:masterClrMapping/>
+  </p:clrMapOvr>
+</p:sld>
+</file>
+
+<file path=ppt/slides/slide19.xml><?xml version="1.0" encoding="utf-8"?>
+<p:sld xmlns:a="http://schemas.openxmlformats.org/drawingml/2006/main" xmlns:r="http://schemas.openxmlformats.org/officeDocument/2006/relationships" xmlns:p="http://schemas.openxmlformats.org/presentationml/2006/main">
+  <p:cSld>
+    <p:spTree>
+      <p:nvGrpSpPr>
+        <p:cNvPr id="1" name=""/>
+        <p:cNvGrpSpPr/>
+        <p:nvPr/>
+      </p:nvGrpSpPr>
+      <p:grpSpPr>
+        <a:xfrm>
+          <a:off x="0" y="0"/>
+          <a:ext cx="0" cy="0"/>
+          <a:chOff x="0" y="0"/>
+          <a:chExt cx="0" cy="0"/>
+        </a:xfrm>
+      </p:grpSpPr>
+      <p:sp>
+        <p:nvSpPr>
+          <p:cNvPr id="2" name="Title 1">
+            <a:extLst>
+              <a:ext uri="{FF2B5EF4-FFF2-40B4-BE49-F238E27FC236}">
+                <a16:creationId xmlns:a16="http://schemas.microsoft.com/office/drawing/2014/main" id="{92FB2BD3-62D4-471A-A5F5-44279DE500A2}"/>
+              </a:ext>
+            </a:extLst>
+          </p:cNvPr>
+          <p:cNvSpPr>
+            <a:spLocks noGrp="1"/>
+          </p:cNvSpPr>
+          <p:nvPr>
+            <p:ph type="title"/>
+          </p:nvPr>
+        </p:nvSpPr>
+        <p:spPr/>
+        <p:txBody>
+          <a:bodyPr/>
+          <a:lstStyle/>
+          <a:p>
+            <a:endParaRPr lang="en-US"/>
+          </a:p>
+        </p:txBody>
+      </p:sp>
+      <p:sp>
+        <p:nvSpPr>
+          <p:cNvPr id="3" name="Content Placeholder 2">
+            <a:extLst>
+              <a:ext uri="{FF2B5EF4-FFF2-40B4-BE49-F238E27FC236}">
+                <a16:creationId xmlns:a16="http://schemas.microsoft.com/office/drawing/2014/main" id="{9ADF6286-47DE-4265-A501-1853B1C05BAC}"/>
+              </a:ext>
+            </a:extLst>
+          </p:cNvPr>
+          <p:cNvSpPr>
+            <a:spLocks noGrp="1"/>
+          </p:cNvSpPr>
+          <p:nvPr>
+            <p:ph idx="1"/>
+          </p:nvPr>
+        </p:nvSpPr>
+        <p:spPr/>
+        <p:txBody>
+          <a:bodyPr/>
+          <a:lstStyle/>
+          <a:p>
+            <a:endParaRPr lang="en-US"/>
+          </a:p>
+        </p:txBody>
+      </p:sp>
+      <p:pic>
+        <p:nvPicPr>
+          <p:cNvPr id="5" name="Picture 4">
+            <a:extLst>
+              <a:ext uri="{FF2B5EF4-FFF2-40B4-BE49-F238E27FC236}">
+                <a16:creationId xmlns:a16="http://schemas.microsoft.com/office/drawing/2014/main" id="{EE654F6B-BD56-4815-9C78-B15A2F78949D}"/>
+              </a:ext>
+            </a:extLst>
+          </p:cNvPr>
+          <p:cNvPicPr>
+            <a:picLocks noChangeAspect="1"/>
+          </p:cNvPicPr>
+          <p:nvPr/>
+        </p:nvPicPr>
+        <p:blipFill>
+          <a:blip r:embed="rId2"/>
+          <a:stretch>
+            <a:fillRect/>
+          </a:stretch>
+        </p:blipFill>
+        <p:spPr>
+          <a:xfrm>
+            <a:off x="0" y="0"/>
+            <a:ext cx="12192000" cy="6857999"/>
+          </a:xfrm>
+          <a:prstGeom prst="rect">
+            <a:avLst/>
+          </a:prstGeom>
+        </p:spPr>
+      </p:pic>
+    </p:spTree>
+    <p:extLst>
+      <p:ext uri="{BB962C8B-B14F-4D97-AF65-F5344CB8AC3E}">
+        <p14:creationId xmlns:p14="http://schemas.microsoft.com/office/powerpoint/2010/main" val="1476659224"/>
+      </p:ext>
+    </p:extLst>
+  </p:cSld>
+  <p:clrMapOvr>
+    <a:masterClrMapping/>
+  </p:clrMapOvr>
+</p:sld>
+</file>
+
 <file path=ppt/slides/slide2.xml><?xml version="1.0" encoding="utf-8"?>
 <p:sld xmlns:a="http://schemas.openxmlformats.org/drawingml/2006/main" xmlns:r="http://schemas.openxmlformats.org/officeDocument/2006/relationships" xmlns:p="http://schemas.openxmlformats.org/presentationml/2006/main">
   <p:cSld>
@@ -3422,6 +4094,572 @@
     <p:extLst>
       <p:ext uri="{BB962C8B-B14F-4D97-AF65-F5344CB8AC3E}">
         <p14:creationId xmlns:p14="http://schemas.microsoft.com/office/powerpoint/2010/main" val="95182048"/>
+      </p:ext>
+    </p:extLst>
+  </p:cSld>
+  <p:clrMapOvr>
+    <a:masterClrMapping/>
+  </p:clrMapOvr>
+</p:sld>
+</file>
+
+<file path=ppt/slides/slide20.xml><?xml version="1.0" encoding="utf-8"?>
+<p:sld xmlns:a="http://schemas.openxmlformats.org/drawingml/2006/main" xmlns:r="http://schemas.openxmlformats.org/officeDocument/2006/relationships" xmlns:p="http://schemas.openxmlformats.org/presentationml/2006/main">
+  <p:cSld>
+    <p:spTree>
+      <p:nvGrpSpPr>
+        <p:cNvPr id="1" name=""/>
+        <p:cNvGrpSpPr/>
+        <p:nvPr/>
+      </p:nvGrpSpPr>
+      <p:grpSpPr>
+        <a:xfrm>
+          <a:off x="0" y="0"/>
+          <a:ext cx="0" cy="0"/>
+          <a:chOff x="0" y="0"/>
+          <a:chExt cx="0" cy="0"/>
+        </a:xfrm>
+      </p:grpSpPr>
+      <p:pic>
+        <p:nvPicPr>
+          <p:cNvPr id="5" name="Picture 4" descr="A screenshot of a computer&#10;&#10;Description automatically generated with medium confidence">
+            <a:extLst>
+              <a:ext uri="{FF2B5EF4-FFF2-40B4-BE49-F238E27FC236}">
+                <a16:creationId xmlns:a16="http://schemas.microsoft.com/office/drawing/2014/main" id="{E5E206C3-C6AF-4ACB-9AA1-0C336AA209D2}"/>
+              </a:ext>
+            </a:extLst>
+          </p:cNvPr>
+          <p:cNvPicPr>
+            <a:picLocks noChangeAspect="1"/>
+          </p:cNvPicPr>
+          <p:nvPr/>
+        </p:nvPicPr>
+        <p:blipFill>
+          <a:blip r:embed="rId2">
+            <a:extLst>
+              <a:ext uri="{28A0092B-C50C-407E-A947-70E740481C1C}">
+                <a14:useLocalDpi xmlns:a14="http://schemas.microsoft.com/office/drawing/2010/main" val="0"/>
+              </a:ext>
+            </a:extLst>
+          </a:blip>
+          <a:stretch>
+            <a:fillRect/>
+          </a:stretch>
+        </p:blipFill>
+        <p:spPr>
+          <a:xfrm>
+            <a:off x="0" y="0"/>
+            <a:ext cx="12192000" cy="6858000"/>
+          </a:xfrm>
+          <a:prstGeom prst="rect">
+            <a:avLst/>
+          </a:prstGeom>
+        </p:spPr>
+      </p:pic>
+    </p:spTree>
+    <p:extLst>
+      <p:ext uri="{BB962C8B-B14F-4D97-AF65-F5344CB8AC3E}">
+        <p14:creationId xmlns:p14="http://schemas.microsoft.com/office/powerpoint/2010/main" val="2753008112"/>
+      </p:ext>
+    </p:extLst>
+  </p:cSld>
+  <p:clrMapOvr>
+    <a:masterClrMapping/>
+  </p:clrMapOvr>
+</p:sld>
+</file>
+
+<file path=ppt/slides/slide21.xml><?xml version="1.0" encoding="utf-8"?>
+<p:sld xmlns:a="http://schemas.openxmlformats.org/drawingml/2006/main" xmlns:r="http://schemas.openxmlformats.org/officeDocument/2006/relationships" xmlns:p="http://schemas.openxmlformats.org/presentationml/2006/main">
+  <p:cSld>
+    <p:spTree>
+      <p:nvGrpSpPr>
+        <p:cNvPr id="1" name=""/>
+        <p:cNvGrpSpPr/>
+        <p:nvPr/>
+      </p:nvGrpSpPr>
+      <p:grpSpPr>
+        <a:xfrm>
+          <a:off x="0" y="0"/>
+          <a:ext cx="0" cy="0"/>
+          <a:chOff x="0" y="0"/>
+          <a:chExt cx="0" cy="0"/>
+        </a:xfrm>
+      </p:grpSpPr>
+      <p:pic>
+        <p:nvPicPr>
+          <p:cNvPr id="5" name="Picture 4">
+            <a:extLst>
+              <a:ext uri="{FF2B5EF4-FFF2-40B4-BE49-F238E27FC236}">
+                <a16:creationId xmlns:a16="http://schemas.microsoft.com/office/drawing/2014/main" id="{CEA951D5-B8D1-4966-8A7A-9F6E17140D6B}"/>
+              </a:ext>
+            </a:extLst>
+          </p:cNvPr>
+          <p:cNvPicPr>
+            <a:picLocks noChangeAspect="1"/>
+          </p:cNvPicPr>
+          <p:nvPr/>
+        </p:nvPicPr>
+        <p:blipFill>
+          <a:blip r:embed="rId2"/>
+          <a:stretch>
+            <a:fillRect/>
+          </a:stretch>
+        </p:blipFill>
+        <p:spPr>
+          <a:xfrm>
+            <a:off x="0" y="0"/>
+            <a:ext cx="12192000" cy="6857999"/>
+          </a:xfrm>
+          <a:prstGeom prst="rect">
+            <a:avLst/>
+          </a:prstGeom>
+        </p:spPr>
+      </p:pic>
+    </p:spTree>
+    <p:extLst>
+      <p:ext uri="{BB962C8B-B14F-4D97-AF65-F5344CB8AC3E}">
+        <p14:creationId xmlns:p14="http://schemas.microsoft.com/office/powerpoint/2010/main" val="1917812991"/>
+      </p:ext>
+    </p:extLst>
+  </p:cSld>
+  <p:clrMapOvr>
+    <a:masterClrMapping/>
+  </p:clrMapOvr>
+</p:sld>
+</file>
+
+<file path=ppt/slides/slide22.xml><?xml version="1.0" encoding="utf-8"?>
+<p:sld xmlns:a="http://schemas.openxmlformats.org/drawingml/2006/main" xmlns:r="http://schemas.openxmlformats.org/officeDocument/2006/relationships" xmlns:p="http://schemas.openxmlformats.org/presentationml/2006/main">
+  <p:cSld>
+    <p:spTree>
+      <p:nvGrpSpPr>
+        <p:cNvPr id="1" name=""/>
+        <p:cNvGrpSpPr/>
+        <p:nvPr/>
+      </p:nvGrpSpPr>
+      <p:grpSpPr>
+        <a:xfrm>
+          <a:off x="0" y="0"/>
+          <a:ext cx="0" cy="0"/>
+          <a:chOff x="0" y="0"/>
+          <a:chExt cx="0" cy="0"/>
+        </a:xfrm>
+      </p:grpSpPr>
+      <p:sp>
+        <p:nvSpPr>
+          <p:cNvPr id="2" name="Title 1">
+            <a:extLst>
+              <a:ext uri="{FF2B5EF4-FFF2-40B4-BE49-F238E27FC236}">
+                <a16:creationId xmlns:a16="http://schemas.microsoft.com/office/drawing/2014/main" id="{CF941D5E-D064-482D-A8F2-A49AA475808F}"/>
+              </a:ext>
+            </a:extLst>
+          </p:cNvPr>
+          <p:cNvSpPr>
+            <a:spLocks noGrp="1"/>
+          </p:cNvSpPr>
+          <p:nvPr>
+            <p:ph type="title"/>
+          </p:nvPr>
+        </p:nvSpPr>
+        <p:spPr/>
+        <p:txBody>
+          <a:bodyPr/>
+          <a:lstStyle/>
+          <a:p>
+            <a:endParaRPr lang="en-US"/>
+          </a:p>
+        </p:txBody>
+      </p:sp>
+      <p:sp>
+        <p:nvSpPr>
+          <p:cNvPr id="3" name="Content Placeholder 2">
+            <a:extLst>
+              <a:ext uri="{FF2B5EF4-FFF2-40B4-BE49-F238E27FC236}">
+                <a16:creationId xmlns:a16="http://schemas.microsoft.com/office/drawing/2014/main" id="{7EE0BD32-381B-48CF-AB38-D20E4176DFBF}"/>
+              </a:ext>
+            </a:extLst>
+          </p:cNvPr>
+          <p:cNvSpPr>
+            <a:spLocks noGrp="1"/>
+          </p:cNvSpPr>
+          <p:nvPr>
+            <p:ph idx="1"/>
+          </p:nvPr>
+        </p:nvSpPr>
+        <p:spPr/>
+        <p:txBody>
+          <a:bodyPr/>
+          <a:lstStyle/>
+          <a:p>
+            <a:endParaRPr lang="en-US"/>
+          </a:p>
+        </p:txBody>
+      </p:sp>
+      <p:pic>
+        <p:nvPicPr>
+          <p:cNvPr id="5" name="Picture 4">
+            <a:extLst>
+              <a:ext uri="{FF2B5EF4-FFF2-40B4-BE49-F238E27FC236}">
+                <a16:creationId xmlns:a16="http://schemas.microsoft.com/office/drawing/2014/main" id="{BECC3207-16AF-4486-8457-F9A105E50BFF}"/>
+              </a:ext>
+            </a:extLst>
+          </p:cNvPr>
+          <p:cNvPicPr>
+            <a:picLocks noChangeAspect="1"/>
+          </p:cNvPicPr>
+          <p:nvPr/>
+        </p:nvPicPr>
+        <p:blipFill>
+          <a:blip r:embed="rId2"/>
+          <a:stretch>
+            <a:fillRect/>
+          </a:stretch>
+        </p:blipFill>
+        <p:spPr>
+          <a:xfrm>
+            <a:off x="0" y="0"/>
+            <a:ext cx="12192000" cy="6857999"/>
+          </a:xfrm>
+          <a:prstGeom prst="rect">
+            <a:avLst/>
+          </a:prstGeom>
+        </p:spPr>
+      </p:pic>
+    </p:spTree>
+    <p:extLst>
+      <p:ext uri="{BB962C8B-B14F-4D97-AF65-F5344CB8AC3E}">
+        <p14:creationId xmlns:p14="http://schemas.microsoft.com/office/powerpoint/2010/main" val="44588084"/>
+      </p:ext>
+    </p:extLst>
+  </p:cSld>
+  <p:clrMapOvr>
+    <a:masterClrMapping/>
+  </p:clrMapOvr>
+</p:sld>
+</file>
+
+<file path=ppt/slides/slide23.xml><?xml version="1.0" encoding="utf-8"?>
+<p:sld xmlns:a="http://schemas.openxmlformats.org/drawingml/2006/main" xmlns:r="http://schemas.openxmlformats.org/officeDocument/2006/relationships" xmlns:p="http://schemas.openxmlformats.org/presentationml/2006/main">
+  <p:cSld>
+    <p:spTree>
+      <p:nvGrpSpPr>
+        <p:cNvPr id="1" name=""/>
+        <p:cNvGrpSpPr/>
+        <p:nvPr/>
+      </p:nvGrpSpPr>
+      <p:grpSpPr>
+        <a:xfrm>
+          <a:off x="0" y="0"/>
+          <a:ext cx="0" cy="0"/>
+          <a:chOff x="0" y="0"/>
+          <a:chExt cx="0" cy="0"/>
+        </a:xfrm>
+      </p:grpSpPr>
+      <p:sp>
+        <p:nvSpPr>
+          <p:cNvPr id="2" name="Title 1">
+            <a:extLst>
+              <a:ext uri="{FF2B5EF4-FFF2-40B4-BE49-F238E27FC236}">
+                <a16:creationId xmlns:a16="http://schemas.microsoft.com/office/drawing/2014/main" id="{1095438F-A788-4837-AE43-A01EA7726417}"/>
+              </a:ext>
+            </a:extLst>
+          </p:cNvPr>
+          <p:cNvSpPr>
+            <a:spLocks noGrp="1"/>
+          </p:cNvSpPr>
+          <p:nvPr>
+            <p:ph type="title"/>
+          </p:nvPr>
+        </p:nvSpPr>
+        <p:spPr/>
+        <p:txBody>
+          <a:bodyPr/>
+          <a:lstStyle/>
+          <a:p>
+            <a:endParaRPr lang="en-US"/>
+          </a:p>
+        </p:txBody>
+      </p:sp>
+      <p:sp>
+        <p:nvSpPr>
+          <p:cNvPr id="3" name="Content Placeholder 2">
+            <a:extLst>
+              <a:ext uri="{FF2B5EF4-FFF2-40B4-BE49-F238E27FC236}">
+                <a16:creationId xmlns:a16="http://schemas.microsoft.com/office/drawing/2014/main" id="{EADE5692-E5F2-4B5E-AAF9-5DDF5B617CB5}"/>
+              </a:ext>
+            </a:extLst>
+          </p:cNvPr>
+          <p:cNvSpPr>
+            <a:spLocks noGrp="1"/>
+          </p:cNvSpPr>
+          <p:nvPr>
+            <p:ph idx="1"/>
+          </p:nvPr>
+        </p:nvSpPr>
+        <p:spPr/>
+        <p:txBody>
+          <a:bodyPr/>
+          <a:lstStyle/>
+          <a:p>
+            <a:endParaRPr lang="en-US"/>
+          </a:p>
+        </p:txBody>
+      </p:sp>
+      <p:pic>
+        <p:nvPicPr>
+          <p:cNvPr id="5" name="Picture 4">
+            <a:extLst>
+              <a:ext uri="{FF2B5EF4-FFF2-40B4-BE49-F238E27FC236}">
+                <a16:creationId xmlns:a16="http://schemas.microsoft.com/office/drawing/2014/main" id="{6D951D6D-9BA6-480F-B4AA-4BCAB67D4391}"/>
+              </a:ext>
+            </a:extLst>
+          </p:cNvPr>
+          <p:cNvPicPr>
+            <a:picLocks noChangeAspect="1"/>
+          </p:cNvPicPr>
+          <p:nvPr/>
+        </p:nvPicPr>
+        <p:blipFill>
+          <a:blip r:embed="rId2"/>
+          <a:stretch>
+            <a:fillRect/>
+          </a:stretch>
+        </p:blipFill>
+        <p:spPr>
+          <a:xfrm>
+            <a:off x="0" y="0"/>
+            <a:ext cx="12192000" cy="6857999"/>
+          </a:xfrm>
+          <a:prstGeom prst="rect">
+            <a:avLst/>
+          </a:prstGeom>
+        </p:spPr>
+      </p:pic>
+    </p:spTree>
+    <p:extLst>
+      <p:ext uri="{BB962C8B-B14F-4D97-AF65-F5344CB8AC3E}">
+        <p14:creationId xmlns:p14="http://schemas.microsoft.com/office/powerpoint/2010/main" val="90099416"/>
+      </p:ext>
+    </p:extLst>
+  </p:cSld>
+  <p:clrMapOvr>
+    <a:masterClrMapping/>
+  </p:clrMapOvr>
+</p:sld>
+</file>
+
+<file path=ppt/slides/slide24.xml><?xml version="1.0" encoding="utf-8"?>
+<p:sld xmlns:a="http://schemas.openxmlformats.org/drawingml/2006/main" xmlns:r="http://schemas.openxmlformats.org/officeDocument/2006/relationships" xmlns:p="http://schemas.openxmlformats.org/presentationml/2006/main">
+  <p:cSld>
+    <p:spTree>
+      <p:nvGrpSpPr>
+        <p:cNvPr id="1" name=""/>
+        <p:cNvGrpSpPr/>
+        <p:nvPr/>
+      </p:nvGrpSpPr>
+      <p:grpSpPr>
+        <a:xfrm>
+          <a:off x="0" y="0"/>
+          <a:ext cx="0" cy="0"/>
+          <a:chOff x="0" y="0"/>
+          <a:chExt cx="0" cy="0"/>
+        </a:xfrm>
+      </p:grpSpPr>
+      <p:sp>
+        <p:nvSpPr>
+          <p:cNvPr id="2" name="Title 1">
+            <a:extLst>
+              <a:ext uri="{FF2B5EF4-FFF2-40B4-BE49-F238E27FC236}">
+                <a16:creationId xmlns:a16="http://schemas.microsoft.com/office/drawing/2014/main" id="{6CF9090F-3433-4FA4-98B6-5E815F3E72BA}"/>
+              </a:ext>
+            </a:extLst>
+          </p:cNvPr>
+          <p:cNvSpPr>
+            <a:spLocks noGrp="1"/>
+          </p:cNvSpPr>
+          <p:nvPr>
+            <p:ph type="title"/>
+          </p:nvPr>
+        </p:nvSpPr>
+        <p:spPr/>
+        <p:txBody>
+          <a:bodyPr/>
+          <a:lstStyle/>
+          <a:p>
+            <a:endParaRPr lang="en-US"/>
+          </a:p>
+        </p:txBody>
+      </p:sp>
+      <p:sp>
+        <p:nvSpPr>
+          <p:cNvPr id="3" name="Content Placeholder 2">
+            <a:extLst>
+              <a:ext uri="{FF2B5EF4-FFF2-40B4-BE49-F238E27FC236}">
+                <a16:creationId xmlns:a16="http://schemas.microsoft.com/office/drawing/2014/main" id="{1D31143A-D38A-4CFA-B1AC-2FDCA3FBD2F4}"/>
+              </a:ext>
+            </a:extLst>
+          </p:cNvPr>
+          <p:cNvSpPr>
+            <a:spLocks noGrp="1"/>
+          </p:cNvSpPr>
+          <p:nvPr>
+            <p:ph idx="1"/>
+          </p:nvPr>
+        </p:nvSpPr>
+        <p:spPr/>
+        <p:txBody>
+          <a:bodyPr/>
+          <a:lstStyle/>
+          <a:p>
+            <a:endParaRPr lang="en-US"/>
+          </a:p>
+        </p:txBody>
+      </p:sp>
+      <p:pic>
+        <p:nvPicPr>
+          <p:cNvPr id="5" name="Picture 4">
+            <a:extLst>
+              <a:ext uri="{FF2B5EF4-FFF2-40B4-BE49-F238E27FC236}">
+                <a16:creationId xmlns:a16="http://schemas.microsoft.com/office/drawing/2014/main" id="{0286F327-84AC-4BD2-B563-DB04FAC185F8}"/>
+              </a:ext>
+            </a:extLst>
+          </p:cNvPr>
+          <p:cNvPicPr>
+            <a:picLocks noChangeAspect="1"/>
+          </p:cNvPicPr>
+          <p:nvPr/>
+        </p:nvPicPr>
+        <p:blipFill>
+          <a:blip r:embed="rId2"/>
+          <a:stretch>
+            <a:fillRect/>
+          </a:stretch>
+        </p:blipFill>
+        <p:spPr>
+          <a:xfrm>
+            <a:off x="0" y="0"/>
+            <a:ext cx="12192000" cy="6857999"/>
+          </a:xfrm>
+          <a:prstGeom prst="rect">
+            <a:avLst/>
+          </a:prstGeom>
+        </p:spPr>
+      </p:pic>
+    </p:spTree>
+    <p:extLst>
+      <p:ext uri="{BB962C8B-B14F-4D97-AF65-F5344CB8AC3E}">
+        <p14:creationId xmlns:p14="http://schemas.microsoft.com/office/powerpoint/2010/main" val="3721598735"/>
+      </p:ext>
+    </p:extLst>
+  </p:cSld>
+  <p:clrMapOvr>
+    <a:masterClrMapping/>
+  </p:clrMapOvr>
+</p:sld>
+</file>
+
+<file path=ppt/slides/slide25.xml><?xml version="1.0" encoding="utf-8"?>
+<p:sld xmlns:a="http://schemas.openxmlformats.org/drawingml/2006/main" xmlns:r="http://schemas.openxmlformats.org/officeDocument/2006/relationships" xmlns:p="http://schemas.openxmlformats.org/presentationml/2006/main">
+  <p:cSld>
+    <p:spTree>
+      <p:nvGrpSpPr>
+        <p:cNvPr id="1" name=""/>
+        <p:cNvGrpSpPr/>
+        <p:nvPr/>
+      </p:nvGrpSpPr>
+      <p:grpSpPr>
+        <a:xfrm>
+          <a:off x="0" y="0"/>
+          <a:ext cx="0" cy="0"/>
+          <a:chOff x="0" y="0"/>
+          <a:chExt cx="0" cy="0"/>
+        </a:xfrm>
+      </p:grpSpPr>
+      <p:sp>
+        <p:nvSpPr>
+          <p:cNvPr id="2" name="Title 1">
+            <a:extLst>
+              <a:ext uri="{FF2B5EF4-FFF2-40B4-BE49-F238E27FC236}">
+                <a16:creationId xmlns:a16="http://schemas.microsoft.com/office/drawing/2014/main" id="{7226D2F7-60E9-415F-851D-7D49180431D1}"/>
+              </a:ext>
+            </a:extLst>
+          </p:cNvPr>
+          <p:cNvSpPr>
+            <a:spLocks noGrp="1"/>
+          </p:cNvSpPr>
+          <p:nvPr>
+            <p:ph type="title"/>
+          </p:nvPr>
+        </p:nvSpPr>
+        <p:spPr/>
+        <p:txBody>
+          <a:bodyPr/>
+          <a:lstStyle/>
+          <a:p>
+            <a:endParaRPr lang="en-US"/>
+          </a:p>
+        </p:txBody>
+      </p:sp>
+      <p:sp>
+        <p:nvSpPr>
+          <p:cNvPr id="3" name="Content Placeholder 2">
+            <a:extLst>
+              <a:ext uri="{FF2B5EF4-FFF2-40B4-BE49-F238E27FC236}">
+                <a16:creationId xmlns:a16="http://schemas.microsoft.com/office/drawing/2014/main" id="{4AD45FE9-B02F-4943-942F-C02FEC00D8BC}"/>
+              </a:ext>
+            </a:extLst>
+          </p:cNvPr>
+          <p:cNvSpPr>
+            <a:spLocks noGrp="1"/>
+          </p:cNvSpPr>
+          <p:nvPr>
+            <p:ph idx="1"/>
+          </p:nvPr>
+        </p:nvSpPr>
+        <p:spPr/>
+        <p:txBody>
+          <a:bodyPr/>
+          <a:lstStyle/>
+          <a:p>
+            <a:endParaRPr lang="en-US"/>
+          </a:p>
+        </p:txBody>
+      </p:sp>
+      <p:pic>
+        <p:nvPicPr>
+          <p:cNvPr id="5" name="Picture 4">
+            <a:extLst>
+              <a:ext uri="{FF2B5EF4-FFF2-40B4-BE49-F238E27FC236}">
+                <a16:creationId xmlns:a16="http://schemas.microsoft.com/office/drawing/2014/main" id="{18AE03E4-EFC1-4A99-BACF-236D066B9CD8}"/>
+              </a:ext>
+            </a:extLst>
+          </p:cNvPr>
+          <p:cNvPicPr>
+            <a:picLocks noChangeAspect="1"/>
+          </p:cNvPicPr>
+          <p:nvPr/>
+        </p:nvPicPr>
+        <p:blipFill>
+          <a:blip r:embed="rId2"/>
+          <a:stretch>
+            <a:fillRect/>
+          </a:stretch>
+        </p:blipFill>
+        <p:spPr>
+          <a:xfrm>
+            <a:off x="0" y="0"/>
+            <a:ext cx="12192000" cy="6858000"/>
+          </a:xfrm>
+          <a:prstGeom prst="rect">
+            <a:avLst/>
+          </a:prstGeom>
+        </p:spPr>
+      </p:pic>
+    </p:spTree>
+    <p:extLst>
+      <p:ext uri="{BB962C8B-B14F-4D97-AF65-F5344CB8AC3E}">
+        <p14:creationId xmlns:p14="http://schemas.microsoft.com/office/powerpoint/2010/main" val="4208515679"/>
       </p:ext>
     </p:extLst>
   </p:cSld>
@@ -3832,6 +5070,66 @@
     <p:extLst>
       <p:ext uri="{BB962C8B-B14F-4D97-AF65-F5344CB8AC3E}">
         <p14:creationId xmlns:p14="http://schemas.microsoft.com/office/powerpoint/2010/main" val="2487552037"/>
+      </p:ext>
+    </p:extLst>
+  </p:cSld>
+  <p:clrMapOvr>
+    <a:masterClrMapping/>
+  </p:clrMapOvr>
+</p:sld>
+</file>
+
+<file path=ppt/slides/slide9.xml><?xml version="1.0" encoding="utf-8"?>
+<p:sld xmlns:a="http://schemas.openxmlformats.org/drawingml/2006/main" xmlns:r="http://schemas.openxmlformats.org/officeDocument/2006/relationships" xmlns:p="http://schemas.openxmlformats.org/presentationml/2006/main">
+  <p:cSld>
+    <p:spTree>
+      <p:nvGrpSpPr>
+        <p:cNvPr id="1" name=""/>
+        <p:cNvGrpSpPr/>
+        <p:nvPr/>
+      </p:nvGrpSpPr>
+      <p:grpSpPr>
+        <a:xfrm>
+          <a:off x="0" y="0"/>
+          <a:ext cx="0" cy="0"/>
+          <a:chOff x="0" y="0"/>
+          <a:chExt cx="0" cy="0"/>
+        </a:xfrm>
+      </p:grpSpPr>
+      <p:pic>
+        <p:nvPicPr>
+          <p:cNvPr id="5" name="Picture 4">
+            <a:extLst>
+              <a:ext uri="{FF2B5EF4-FFF2-40B4-BE49-F238E27FC236}">
+                <a16:creationId xmlns:a16="http://schemas.microsoft.com/office/drawing/2014/main" id="{C85C189D-AA29-48DF-A0D0-6D5609757F40}"/>
+              </a:ext>
+            </a:extLst>
+          </p:cNvPr>
+          <p:cNvPicPr>
+            <a:picLocks noChangeAspect="1"/>
+          </p:cNvPicPr>
+          <p:nvPr/>
+        </p:nvPicPr>
+        <p:blipFill>
+          <a:blip r:embed="rId2"/>
+          <a:stretch>
+            <a:fillRect/>
+          </a:stretch>
+        </p:blipFill>
+        <p:spPr>
+          <a:xfrm>
+            <a:off x="0" y="0"/>
+            <a:ext cx="12192000" cy="6857999"/>
+          </a:xfrm>
+          <a:prstGeom prst="rect">
+            <a:avLst/>
+          </a:prstGeom>
+        </p:spPr>
+      </p:pic>
+    </p:spTree>
+    <p:extLst>
+      <p:ext uri="{BB962C8B-B14F-4D97-AF65-F5344CB8AC3E}">
+        <p14:creationId xmlns:p14="http://schemas.microsoft.com/office/powerpoint/2010/main" val="3892020568"/>
       </p:ext>
     </p:extLst>
   </p:cSld>

</xml_diff>